<commit_message>
Last Version of presentation
</commit_message>
<xml_diff>
--- a/direction_calculator/Presentation/When the wise man points to the ISS.pptx
+++ b/direction_calculator/Presentation/When the wise man points to the ISS.pptx
@@ -113,6 +113,11 @@
       </a:defRPr>
     </a:lvl9pPr>
   </p:defaultTextStyle>
+  <p:extLst>
+    <p:ext uri="{EFAFB233-063F-42B5-8137-9DF3F51BA10A}">
+      <p15:sldGuideLst xmlns:p15="http://schemas.microsoft.com/office/powerpoint/2012/main"/>
+    </p:ext>
+  </p:extLst>
 </p:presentation>
 </file>
 
@@ -1047,15 +1052,151 @@
             </a:r>
             <a:r>
               <a:rPr lang="fr-CH" dirty="0"/>
-              <a:t>. </a:t>
-            </a:r>
-            <a:r>
-              <a:rPr lang="fr-CH" dirty="0" err="1"/>
-              <a:t>Then</a:t>
+              <a:t>. One important </a:t>
+            </a:r>
+            <a:r>
+              <a:rPr lang="fr-CH" dirty="0" err="1"/>
+              <a:t>thing</a:t>
+            </a:r>
+            <a:r>
+              <a:rPr lang="fr-CH" dirty="0"/>
+              <a:t> for </a:t>
+            </a:r>
+            <a:r>
+              <a:rPr lang="fr-CH" dirty="0" err="1"/>
+              <a:t>this</a:t>
+            </a:r>
+            <a:r>
+              <a:rPr lang="fr-CH" dirty="0"/>
+              <a:t> part </a:t>
+            </a:r>
+            <a:r>
+              <a:rPr lang="fr-CH" dirty="0" err="1"/>
+              <a:t>is</a:t>
             </a:r>
             <a:r>
               <a:rPr lang="fr-CH" dirty="0"/>
               <a:t> </a:t>
+            </a:r>
+            <a:r>
+              <a:rPr lang="fr-CH" dirty="0" err="1"/>
+              <a:t>that</a:t>
+            </a:r>
+            <a:r>
+              <a:rPr lang="fr-CH" dirty="0"/>
+              <a:t> the </a:t>
+            </a:r>
+            <a:r>
+              <a:rPr lang="fr-CH" dirty="0" err="1"/>
+              <a:t>earth</a:t>
+            </a:r>
+            <a:r>
+              <a:rPr lang="fr-CH" dirty="0"/>
+              <a:t> </a:t>
+            </a:r>
+            <a:r>
+              <a:rPr lang="fr-CH" dirty="0" err="1"/>
+              <a:t>is</a:t>
+            </a:r>
+            <a:r>
+              <a:rPr lang="fr-CH" dirty="0"/>
+              <a:t> not a </a:t>
+            </a:r>
+            <a:r>
+              <a:rPr lang="fr-CH" dirty="0" err="1"/>
+              <a:t>perfect</a:t>
+            </a:r>
+            <a:r>
+              <a:rPr lang="fr-CH" dirty="0"/>
+              <a:t> </a:t>
+            </a:r>
+            <a:r>
+              <a:rPr lang="fr-CH" dirty="0" err="1"/>
+              <a:t>sphere</a:t>
+            </a:r>
+            <a:r>
+              <a:rPr lang="fr-CH" dirty="0"/>
+              <a:t> but an </a:t>
+            </a:r>
+            <a:r>
+              <a:rPr lang="fr-CH" dirty="0" err="1"/>
+              <a:t>ellispoid</a:t>
+            </a:r>
+            <a:r>
+              <a:rPr lang="fr-CH" dirty="0"/>
+              <a:t>. For </a:t>
+            </a:r>
+            <a:r>
+              <a:rPr lang="fr-CH" dirty="0" err="1"/>
+              <a:t>that</a:t>
+            </a:r>
+            <a:r>
+              <a:rPr lang="fr-CH" dirty="0"/>
+              <a:t>, the radius </a:t>
+            </a:r>
+            <a:r>
+              <a:rPr lang="fr-CH" dirty="0" err="1"/>
+              <a:t>is</a:t>
+            </a:r>
+            <a:r>
+              <a:rPr lang="fr-CH" dirty="0"/>
+              <a:t> not the </a:t>
+            </a:r>
+            <a:r>
+              <a:rPr lang="fr-CH" dirty="0" err="1"/>
+              <a:t>same</a:t>
+            </a:r>
+            <a:r>
+              <a:rPr lang="fr-CH" dirty="0"/>
+              <a:t> </a:t>
+            </a:r>
+            <a:r>
+              <a:rPr lang="fr-CH" dirty="0" err="1"/>
+              <a:t>everywhere</a:t>
+            </a:r>
+            <a:r>
+              <a:rPr lang="fr-CH" dirty="0"/>
+              <a:t> and has to </a:t>
+            </a:r>
+            <a:r>
+              <a:rPr lang="fr-CH" dirty="0" err="1"/>
+              <a:t>be</a:t>
+            </a:r>
+            <a:r>
+              <a:rPr lang="fr-CH" dirty="0"/>
+              <a:t> </a:t>
+            </a:r>
+            <a:r>
+              <a:rPr lang="fr-CH" dirty="0" err="1"/>
+              <a:t>calculate</a:t>
+            </a:r>
+            <a:r>
+              <a:rPr lang="fr-CH" dirty="0"/>
+              <a:t> for </a:t>
+            </a:r>
+            <a:r>
+              <a:rPr lang="fr-CH" dirty="0" err="1"/>
+              <a:t>each</a:t>
+            </a:r>
+            <a:r>
+              <a:rPr lang="fr-CH" dirty="0"/>
+              <a:t> place. </a:t>
+            </a:r>
+            <a:r>
+              <a:rPr lang="fr-CH" dirty="0" err="1"/>
+              <a:t>After</a:t>
+            </a:r>
+            <a:r>
+              <a:rPr lang="fr-CH" dirty="0"/>
+              <a:t> </a:t>
+            </a:r>
+            <a:r>
+              <a:rPr lang="fr-CH" dirty="0" err="1"/>
+              <a:t>finding</a:t>
+            </a:r>
+            <a:r>
+              <a:rPr lang="fr-CH" dirty="0"/>
+              <a:t> the radius, </a:t>
             </a:r>
             <a:r>
               <a:rPr lang="fr-CH" dirty="0" err="1"/>
@@ -1198,7 +1339,7 @@
             </a:r>
             <a:r>
               <a:rPr lang="fr-CH" dirty="0"/>
-              <a:t> a local </a:t>
+              <a:t> a new local </a:t>
             </a:r>
             <a:r>
               <a:rPr lang="fr-CH" dirty="0" err="1"/>
@@ -1230,7 +1371,15 @@
             </a:r>
             <a:r>
               <a:rPr lang="fr-CH" dirty="0"/>
-              <a:t>. The new basis </a:t>
+              <a:t>. </a:t>
+            </a:r>
+            <a:r>
+              <a:rPr lang="fr-CH" dirty="0" err="1"/>
+              <a:t>These</a:t>
+            </a:r>
+            <a:r>
+              <a:rPr lang="fr-CH" dirty="0"/>
+              <a:t> new basis </a:t>
             </a:r>
             <a:r>
               <a:rPr lang="fr-CH" dirty="0" err="1"/>
@@ -1330,11 +1479,11 @@
             </a:r>
             <a:r>
               <a:rPr lang="fr-CH" dirty="0" err="1"/>
-              <a:t>tengential</a:t>
-            </a:r>
-            <a:r>
-              <a:rPr lang="fr-CH" dirty="0"/>
-              <a:t> plane and the </a:t>
+              <a:t>tangential</a:t>
+            </a:r>
+            <a:r>
+              <a:rPr lang="fr-CH" dirty="0"/>
+              <a:t> plane  and the </a:t>
             </a:r>
             <a:r>
               <a:rPr lang="fr-CH" dirty="0" err="1"/>
@@ -1342,6 +1491,14 @@
             </a:r>
             <a:r>
               <a:rPr lang="fr-CH" dirty="0"/>
+              <a:t> and the normal plane and the </a:t>
+            </a:r>
+            <a:r>
+              <a:rPr lang="fr-CH" dirty="0" err="1"/>
+              <a:t>iss</a:t>
+            </a:r>
+            <a:r>
+              <a:rPr lang="fr-CH" dirty="0"/>
               <a:t> </a:t>
             </a:r>
             <a:r>
@@ -1350,11 +1507,19 @@
             </a:r>
             <a:r>
               <a:rPr lang="fr-CH" dirty="0"/>
+              <a:t> (</a:t>
+            </a:r>
+            <a:r>
+              <a:rPr lang="fr-CH" dirty="0" err="1"/>
+              <a:t>that</a:t>
+            </a:r>
+            <a:r>
+              <a:rPr lang="fr-CH" dirty="0"/>
               <a:t> </a:t>
             </a:r>
             <a:r>
               <a:rPr lang="fr-CH" dirty="0" err="1"/>
-              <a:t>that</a:t>
+              <a:t>is</a:t>
             </a:r>
             <a:r>
               <a:rPr lang="fr-CH" dirty="0"/>
@@ -1362,14 +1527,6 @@
             </a:r>
             <a:r>
               <a:rPr lang="fr-CH" dirty="0" err="1"/>
-              <a:t>is</a:t>
-            </a:r>
-            <a:r>
-              <a:rPr lang="fr-CH" dirty="0"/>
-              <a:t> </a:t>
-            </a:r>
-            <a:r>
-              <a:rPr lang="fr-CH" dirty="0" err="1"/>
               <a:t>given</a:t>
             </a:r>
             <a:r>
@@ -1382,7 +1539,7 @@
             </a:r>
             <a:r>
               <a:rPr lang="fr-CH" dirty="0"/>
-              <a:t> program. The </a:t>
+              <a:t> program). In the end the </a:t>
             </a:r>
             <a:r>
               <a:rPr lang="fr-CH" dirty="0" err="1"/>
@@ -1573,7 +1730,23 @@
             </a:r>
             <a:r>
               <a:rPr lang="fr-CH" dirty="0"/>
-              <a:t> a simple formula. The last </a:t>
+              <a:t> a simple formula (</a:t>
+            </a:r>
+            <a:r>
+              <a:rPr lang="fr-CH" dirty="0" err="1"/>
+              <a:t>scalar</a:t>
+            </a:r>
+            <a:r>
+              <a:rPr lang="fr-CH" dirty="0"/>
+              <a:t> </a:t>
+            </a:r>
+            <a:r>
+              <a:rPr lang="fr-CH" dirty="0" err="1"/>
+              <a:t>product</a:t>
+            </a:r>
+            <a:r>
+              <a:rPr lang="fr-CH" dirty="0"/>
+              <a:t>). The last </a:t>
             </a:r>
             <a:r>
               <a:rPr lang="fr-CH" dirty="0" err="1"/>
@@ -1589,7 +1762,7 @@
             </a:r>
             <a:r>
               <a:rPr lang="fr-CH" dirty="0"/>
-              <a:t> are the initial angles and the position of the </a:t>
+              <a:t> are the initial angles of the machine and the position of the </a:t>
             </a:r>
             <a:r>
               <a:rPr lang="fr-CH" dirty="0" err="1"/>
@@ -1597,15 +1770,55 @@
             </a:r>
             <a:r>
               <a:rPr lang="fr-CH" dirty="0"/>
-              <a:t> the correct the angles. </a:t>
-            </a:r>
-            <a:r>
-              <a:rPr lang="fr-CH" dirty="0" err="1"/>
-              <a:t>That’s</a:t>
-            </a:r>
-            <a:r>
-              <a:rPr lang="fr-CH" dirty="0"/>
-              <a:t> the deltas in the formulas.</a:t>
+              <a:t> </a:t>
+            </a:r>
+            <a:r>
+              <a:rPr lang="fr-CH" dirty="0" err="1"/>
+              <a:t>so</a:t>
+            </a:r>
+            <a:r>
+              <a:rPr lang="fr-CH" dirty="0"/>
+              <a:t> </a:t>
+            </a:r>
+            <a:r>
+              <a:rPr lang="fr-CH" dirty="0" err="1"/>
+              <a:t>that</a:t>
+            </a:r>
+            <a:r>
+              <a:rPr lang="fr-CH" dirty="0"/>
+              <a:t> </a:t>
+            </a:r>
+            <a:r>
+              <a:rPr lang="fr-CH" dirty="0" err="1"/>
+              <a:t>we</a:t>
+            </a:r>
+            <a:r>
+              <a:rPr lang="fr-CH" dirty="0"/>
+              <a:t> are sure to </a:t>
+            </a:r>
+            <a:r>
+              <a:rPr lang="fr-CH" dirty="0" err="1"/>
+              <a:t>give</a:t>
+            </a:r>
+            <a:r>
+              <a:rPr lang="fr-CH" dirty="0"/>
+              <a:t> the correct angles to the trackers </a:t>
+            </a:r>
+            <a:r>
+              <a:rPr lang="fr-CH" dirty="0" err="1"/>
+              <a:t>motors</a:t>
+            </a:r>
+            <a:r>
+              <a:rPr lang="fr-CH" dirty="0"/>
+              <a:t>. </a:t>
+            </a:r>
+            <a:r>
+              <a:rPr lang="fr-CH" dirty="0" err="1"/>
+              <a:t>These</a:t>
+            </a:r>
+            <a:r>
+              <a:rPr lang="fr-CH" dirty="0"/>
+              <a:t> variations in angles are the deltas in the formulas.</a:t>
             </a:r>
           </a:p>
         </p:txBody>
@@ -5772,8 +5985,8 @@
           </a:prstGeom>
         </p:spPr>
       </p:pic>
-      <mc:AlternateContent xmlns:mc="http://schemas.openxmlformats.org/markup-compatibility/2006">
-        <mc:Choice xmlns:a14="http://schemas.microsoft.com/office/drawing/2010/main" Requires="a14">
+      <mc:AlternateContent xmlns:mc="http://schemas.openxmlformats.org/markup-compatibility/2006" xmlns:a14="http://schemas.microsoft.com/office/drawing/2010/main">
+        <mc:Choice Requires="a14">
           <p:sp>
             <p:nvSpPr>
               <p:cNvPr id="6" name="Rectangle 5">
@@ -5819,6 +6032,7 @@
                         <m:sSupPr>
                           <m:ctrlPr>
                             <a:rPr lang="fr-CH" sz="1400" i="1">
+                              <a:latin typeface="Cambria Math" panose="02040503050406030204" pitchFamily="18" charset="0"/>
                               <a:ea typeface="Times New Roman" panose="02020603050405020304" pitchFamily="18" charset="0"/>
                               <a:cs typeface="Arial" panose="020B0604020202020204" pitchFamily="34" charset="0"/>
                             </a:rPr>
@@ -5827,6 +6041,7 @@
                         <m:e>
                           <m:r>
                             <a:rPr lang="en-GB" sz="1400" i="1">
+                              <a:latin typeface="Cambria Math" panose="02040503050406030204" pitchFamily="18" charset="0"/>
                               <a:ea typeface="Times New Roman" panose="02020603050405020304" pitchFamily="18" charset="0"/>
                               <a:cs typeface="Arial" panose="020B0604020202020204" pitchFamily="34" charset="0"/>
                             </a:rPr>
@@ -5836,6 +6051,7 @@
                         <m:sup>
                           <m:r>
                             <a:rPr lang="en-GB" sz="1400" i="1">
+                              <a:latin typeface="Cambria Math" panose="02040503050406030204" pitchFamily="18" charset="0"/>
                               <a:ea typeface="Times New Roman" panose="02020603050405020304" pitchFamily="18" charset="0"/>
                               <a:cs typeface="Arial" panose="020B0604020202020204" pitchFamily="34" charset="0"/>
                             </a:rPr>
@@ -5845,6 +6061,7 @@
                       </m:sSup>
                       <m:r>
                         <a:rPr lang="en-GB" sz="1400" i="1">
+                          <a:latin typeface="Cambria Math" panose="02040503050406030204" pitchFamily="18" charset="0"/>
                           <a:ea typeface="Times New Roman" panose="02020603050405020304" pitchFamily="18" charset="0"/>
                           <a:cs typeface="Arial" panose="020B0604020202020204" pitchFamily="34" charset="0"/>
                         </a:rPr>
@@ -5854,6 +6071,7 @@
                         <m:dPr>
                           <m:ctrlPr>
                             <a:rPr lang="fr-CH" sz="1400" i="1">
+                              <a:latin typeface="Cambria Math" panose="02040503050406030204" pitchFamily="18" charset="0"/>
                               <a:ea typeface="Calibri" panose="020F0502020204030204" pitchFamily="34" charset="0"/>
                               <a:cs typeface="Arial" panose="020B0604020202020204" pitchFamily="34" charset="0"/>
                             </a:rPr>
@@ -5872,6 +6090,7 @@
                               </m:mcs>
                               <m:ctrlPr>
                                 <a:rPr lang="fr-CH" sz="1400" i="1">
+                                  <a:latin typeface="Cambria Math" panose="02040503050406030204" pitchFamily="18" charset="0"/>
                                   <a:ea typeface="Calibri" panose="020F0502020204030204" pitchFamily="34" charset="0"/>
                                   <a:cs typeface="Arial" panose="020B0604020202020204" pitchFamily="34" charset="0"/>
                                 </a:rPr>
@@ -5881,6 +6100,7 @@
                               <m:e>
                                 <m:r>
                                   <a:rPr lang="en-GB" sz="1400" i="1">
+                                    <a:latin typeface="Cambria Math" panose="02040503050406030204" pitchFamily="18" charset="0"/>
                                     <a:ea typeface="Calibri" panose="020F0502020204030204" pitchFamily="34" charset="0"/>
                                     <a:cs typeface="Arial" panose="020B0604020202020204" pitchFamily="34" charset="0"/>
                                   </a:rPr>
@@ -5888,6 +6108,7 @@
                                 </m:r>
                                 <m:r>
                                   <a:rPr lang="en-GB" sz="1400" i="1">
+                                    <a:latin typeface="Cambria Math" panose="02040503050406030204" pitchFamily="18" charset="0"/>
                                     <a:ea typeface="Calibri" panose="020F0502020204030204" pitchFamily="34" charset="0"/>
                                     <a:cs typeface="Arial" panose="020B0604020202020204" pitchFamily="34" charset="0"/>
                                   </a:rPr>
@@ -5895,6 +6116,7 @@
                                 </m:r>
                                 <m:r>
                                   <a:rPr lang="en-GB" sz="1400" i="1">
+                                    <a:latin typeface="Cambria Math" panose="02040503050406030204" pitchFamily="18" charset="0"/>
                                     <a:ea typeface="Calibri" panose="020F0502020204030204" pitchFamily="34" charset="0"/>
                                     <a:cs typeface="Arial" panose="020B0604020202020204" pitchFamily="34" charset="0"/>
                                   </a:rPr>
@@ -5906,6 +6128,7 @@
                               <m:e>
                                 <m:r>
                                   <a:rPr lang="en-GB" sz="1400" i="1">
+                                    <a:latin typeface="Cambria Math" panose="02040503050406030204" pitchFamily="18" charset="0"/>
                                     <a:ea typeface="Calibri" panose="020F0502020204030204" pitchFamily="34" charset="0"/>
                                     <a:cs typeface="Arial" panose="020B0604020202020204" pitchFamily="34" charset="0"/>
                                   </a:rPr>
@@ -5913,6 +6136,7 @@
                                 </m:r>
                                 <m:r>
                                   <a:rPr lang="en-GB" sz="1400" i="1">
+                                    <a:latin typeface="Cambria Math" panose="02040503050406030204" pitchFamily="18" charset="0"/>
                                     <a:ea typeface="Calibri" panose="020F0502020204030204" pitchFamily="34" charset="0"/>
                                     <a:cs typeface="Arial" panose="020B0604020202020204" pitchFamily="34" charset="0"/>
                                   </a:rPr>
@@ -5924,6 +6148,7 @@
                               <m:e>
                                 <m:r>
                                   <a:rPr lang="en-GB" sz="1400" i="1">
+                                    <a:latin typeface="Cambria Math" panose="02040503050406030204" pitchFamily="18" charset="0"/>
                                     <a:ea typeface="Calibri" panose="020F0502020204030204" pitchFamily="34" charset="0"/>
                                     <a:cs typeface="Arial" panose="020B0604020202020204" pitchFamily="34" charset="0"/>
                                   </a:rPr>
@@ -5936,6 +6161,7 @@
                       </m:d>
                       <m:r>
                         <a:rPr lang="en-GB" sz="1400" i="1">
+                          <a:latin typeface="Cambria Math" panose="02040503050406030204" pitchFamily="18" charset="0"/>
                           <a:ea typeface="Calibri" panose="020F0502020204030204" pitchFamily="34" charset="0"/>
                           <a:cs typeface="Arial" panose="020B0604020202020204" pitchFamily="34" charset="0"/>
                         </a:rPr>
@@ -5946,6 +6172,7 @@
                           <m:chr m:val="⃑"/>
                           <m:ctrlPr>
                             <a:rPr lang="fr-CH" sz="1400" i="1">
+                              <a:latin typeface="Cambria Math" panose="02040503050406030204" pitchFamily="18" charset="0"/>
                               <a:ea typeface="Calibri" panose="020F0502020204030204" pitchFamily="34" charset="0"/>
                               <a:cs typeface="Arial" panose="020B0604020202020204" pitchFamily="34" charset="0"/>
                             </a:rPr>
@@ -5954,6 +6181,7 @@
                         <m:e>
                           <m:r>
                             <a:rPr lang="en-GB" sz="1400" i="1">
+                              <a:latin typeface="Cambria Math" panose="02040503050406030204" pitchFamily="18" charset="0"/>
                               <a:ea typeface="Calibri" panose="020F0502020204030204" pitchFamily="34" charset="0"/>
                               <a:cs typeface="Arial" panose="020B0604020202020204" pitchFamily="34" charset="0"/>
                             </a:rPr>
@@ -5988,6 +6216,7 @@
                         <m:sSupPr>
                           <m:ctrlPr>
                             <a:rPr lang="fr-CH" sz="1400" i="1">
+                              <a:latin typeface="Cambria Math" panose="02040503050406030204" pitchFamily="18" charset="0"/>
                               <a:ea typeface="Times New Roman" panose="02020603050405020304" pitchFamily="18" charset="0"/>
                               <a:cs typeface="Arial" panose="020B0604020202020204" pitchFamily="34" charset="0"/>
                             </a:rPr>
@@ -5996,6 +6225,7 @@
                         <m:e>
                           <m:r>
                             <a:rPr lang="en-GB" sz="1400" i="1">
+                              <a:latin typeface="Cambria Math" panose="02040503050406030204" pitchFamily="18" charset="0"/>
                               <a:ea typeface="Times New Roman" panose="02020603050405020304" pitchFamily="18" charset="0"/>
                               <a:cs typeface="Arial" panose="020B0604020202020204" pitchFamily="34" charset="0"/>
                             </a:rPr>
@@ -6005,6 +6235,7 @@
                         <m:sup>
                           <m:r>
                             <a:rPr lang="en-GB" sz="1400" i="1">
+                              <a:latin typeface="Cambria Math" panose="02040503050406030204" pitchFamily="18" charset="0"/>
                               <a:ea typeface="Times New Roman" panose="02020603050405020304" pitchFamily="18" charset="0"/>
                               <a:cs typeface="Arial" panose="020B0604020202020204" pitchFamily="34" charset="0"/>
                             </a:rPr>
@@ -6014,6 +6245,7 @@
                       </m:sSup>
                       <m:r>
                         <a:rPr lang="en-GB" sz="1400" i="1">
+                          <a:latin typeface="Cambria Math" panose="02040503050406030204" pitchFamily="18" charset="0"/>
                           <a:ea typeface="Times New Roman" panose="02020603050405020304" pitchFamily="18" charset="0"/>
                           <a:cs typeface="Arial" panose="020B0604020202020204" pitchFamily="34" charset="0"/>
                         </a:rPr>
@@ -6023,6 +6255,7 @@
                         <m:dPr>
                           <m:ctrlPr>
                             <a:rPr lang="fr-CH" sz="1400" i="1">
+                              <a:latin typeface="Cambria Math" panose="02040503050406030204" pitchFamily="18" charset="0"/>
                               <a:ea typeface="Calibri" panose="020F0502020204030204" pitchFamily="34" charset="0"/>
                               <a:cs typeface="Arial" panose="020B0604020202020204" pitchFamily="34" charset="0"/>
                             </a:rPr>
@@ -6041,6 +6274,7 @@
                               </m:mcs>
                               <m:ctrlPr>
                                 <a:rPr lang="fr-CH" sz="1400" i="1">
+                                  <a:latin typeface="Cambria Math" panose="02040503050406030204" pitchFamily="18" charset="0"/>
                                   <a:ea typeface="Calibri" panose="020F0502020204030204" pitchFamily="34" charset="0"/>
                                   <a:cs typeface="Arial" panose="020B0604020202020204" pitchFamily="34" charset="0"/>
                                 </a:rPr>
@@ -6052,6 +6286,7 @@
                                   <m:fPr>
                                     <m:ctrlPr>
                                       <a:rPr lang="fr-CH" sz="1400" i="1">
+                                        <a:latin typeface="Cambria Math" panose="02040503050406030204" pitchFamily="18" charset="0"/>
                                         <a:ea typeface="Calibri" panose="020F0502020204030204" pitchFamily="34" charset="0"/>
                                         <a:cs typeface="Arial" panose="020B0604020202020204" pitchFamily="34" charset="0"/>
                                       </a:rPr>
@@ -6062,6 +6297,7 @@
                                       <m:funcPr>
                                         <m:ctrlPr>
                                           <a:rPr lang="fr-CH" sz="1400" i="1">
+                                            <a:latin typeface="Cambria Math" panose="02040503050406030204" pitchFamily="18" charset="0"/>
                                             <a:ea typeface="Calibri" panose="020F0502020204030204" pitchFamily="34" charset="0"/>
                                             <a:cs typeface="Arial" panose="020B0604020202020204" pitchFamily="34" charset="0"/>
                                           </a:rPr>
@@ -6073,6 +6309,7 @@
                                             <m:sty m:val="p"/>
                                           </m:rPr>
                                           <a:rPr lang="en-GB" sz="1400">
+                                            <a:latin typeface="Cambria Math" panose="02040503050406030204" pitchFamily="18" charset="0"/>
                                             <a:ea typeface="Calibri" panose="020F0502020204030204" pitchFamily="34" charset="0"/>
                                             <a:cs typeface="Arial" panose="020B0604020202020204" pitchFamily="34" charset="0"/>
                                           </a:rPr>
@@ -6084,6 +6321,7 @@
                                           <m:dPr>
                                             <m:ctrlPr>
                                               <a:rPr lang="fr-CH" sz="1400" i="1">
+                                                <a:latin typeface="Cambria Math" panose="02040503050406030204" pitchFamily="18" charset="0"/>
                                                 <a:ea typeface="Calibri" panose="020F0502020204030204" pitchFamily="34" charset="0"/>
                                                 <a:cs typeface="Arial" panose="020B0604020202020204" pitchFamily="34" charset="0"/>
                                               </a:rPr>
@@ -6092,6 +6330,7 @@
                                           <m:e>
                                             <m:r>
                                               <a:rPr lang="en-GB" sz="1400" i="1">
+                                                <a:latin typeface="Cambria Math" panose="02040503050406030204" pitchFamily="18" charset="0"/>
                                                 <a:ea typeface="Calibri" panose="020F0502020204030204" pitchFamily="34" charset="0"/>
                                                 <a:cs typeface="Arial" panose="020B0604020202020204" pitchFamily="34" charset="0"/>
                                               </a:rPr>
@@ -6099,6 +6338,7 @@
                                             </m:r>
                                             <m:r>
                                               <a:rPr lang="en-GB" sz="1400" i="1">
+                                                <a:latin typeface="Cambria Math" panose="02040503050406030204" pitchFamily="18" charset="0"/>
                                                 <a:ea typeface="Calibri" panose="020F0502020204030204" pitchFamily="34" charset="0"/>
                                                 <a:cs typeface="Arial" panose="020B0604020202020204" pitchFamily="34" charset="0"/>
                                               </a:rPr>
@@ -6106,6 +6346,7 @@
                                             </m:r>
                                             <m:r>
                                               <a:rPr lang="en-GB" sz="1400" i="1">
+                                                <a:latin typeface="Cambria Math" panose="02040503050406030204" pitchFamily="18" charset="0"/>
                                                 <a:ea typeface="Calibri" panose="020F0502020204030204" pitchFamily="34" charset="0"/>
                                                 <a:cs typeface="Arial" panose="020B0604020202020204" pitchFamily="34" charset="0"/>
                                               </a:rPr>
@@ -6117,6 +6358,7 @@
                                     </m:func>
                                     <m:r>
                                       <a:rPr lang="en-GB" sz="1400" i="1">
+                                        <a:latin typeface="Cambria Math" panose="02040503050406030204" pitchFamily="18" charset="0"/>
                                         <a:ea typeface="Calibri" panose="020F0502020204030204" pitchFamily="34" charset="0"/>
                                         <a:cs typeface="Arial" panose="020B0604020202020204" pitchFamily="34" charset="0"/>
                                       </a:rPr>
@@ -6127,6 +6369,7 @@
                                         <m:sty m:val="p"/>
                                       </m:rPr>
                                       <a:rPr lang="en-GB" sz="1400">
+                                        <a:latin typeface="Cambria Math" panose="02040503050406030204" pitchFamily="18" charset="0"/>
                                         <a:ea typeface="Calibri" panose="020F0502020204030204" pitchFamily="34" charset="0"/>
                                         <a:cs typeface="Arial" panose="020B0604020202020204" pitchFamily="34" charset="0"/>
                                       </a:rPr>
@@ -6134,6 +6377,7 @@
                                     </m:r>
                                     <m:r>
                                       <a:rPr lang="en-GB" sz="1400" i="1">
+                                        <a:latin typeface="Cambria Math" panose="02040503050406030204" pitchFamily="18" charset="0"/>
                                         <a:ea typeface="Calibri" panose="020F0502020204030204" pitchFamily="34" charset="0"/>
                                         <a:cs typeface="Arial" panose="020B0604020202020204" pitchFamily="34" charset="0"/>
                                       </a:rPr>
@@ -6141,6 +6385,7 @@
                                     </m:r>
                                     <m:r>
                                       <a:rPr lang="en-GB" sz="1400" i="1">
+                                        <a:latin typeface="Cambria Math" panose="02040503050406030204" pitchFamily="18" charset="0"/>
                                         <a:ea typeface="Calibri" panose="020F0502020204030204" pitchFamily="34" charset="0"/>
                                         <a:cs typeface="Arial" panose="020B0604020202020204" pitchFamily="34" charset="0"/>
                                       </a:rPr>
@@ -6148,6 +6393,7 @@
                                     </m:r>
                                     <m:r>
                                       <a:rPr lang="en-GB" sz="1400" i="1">
+                                        <a:latin typeface="Cambria Math" panose="02040503050406030204" pitchFamily="18" charset="0"/>
                                         <a:ea typeface="Calibri" panose="020F0502020204030204" pitchFamily="34" charset="0"/>
                                         <a:cs typeface="Arial" panose="020B0604020202020204" pitchFamily="34" charset="0"/>
                                       </a:rPr>
@@ -6155,6 +6401,7 @@
                                     </m:r>
                                     <m:r>
                                       <a:rPr lang="en-GB" sz="1400" i="1">
+                                        <a:latin typeface="Cambria Math" panose="02040503050406030204" pitchFamily="18" charset="0"/>
                                         <a:ea typeface="Calibri" panose="020F0502020204030204" pitchFamily="34" charset="0"/>
                                         <a:cs typeface="Arial" panose="020B0604020202020204" pitchFamily="34" charset="0"/>
                                       </a:rPr>
@@ -6162,6 +6409,7 @@
                                     </m:r>
                                     <m:r>
                                       <a:rPr lang="en-GB" sz="1400" i="1">
+                                        <a:latin typeface="Cambria Math" panose="02040503050406030204" pitchFamily="18" charset="0"/>
                                         <a:ea typeface="Calibri" panose="020F0502020204030204" pitchFamily="34" charset="0"/>
                                         <a:cs typeface="Arial" panose="020B0604020202020204" pitchFamily="34" charset="0"/>
                                       </a:rPr>
@@ -6171,6 +6419,7 @@
                                   <m:den>
                                     <m:r>
                                       <a:rPr lang="en-GB" sz="1400" i="1">
+                                        <a:latin typeface="Cambria Math" panose="02040503050406030204" pitchFamily="18" charset="0"/>
                                         <a:ea typeface="Calibri" panose="020F0502020204030204" pitchFamily="34" charset="0"/>
                                         <a:cs typeface="Arial" panose="020B0604020202020204" pitchFamily="34" charset="0"/>
                                       </a:rPr>
@@ -6186,6 +6435,7 @@
                                   <m:fPr>
                                     <m:ctrlPr>
                                       <a:rPr lang="fr-CH" sz="1400" i="1">
+                                        <a:latin typeface="Cambria Math" panose="02040503050406030204" pitchFamily="18" charset="0"/>
                                         <a:ea typeface="Calibri" panose="020F0502020204030204" pitchFamily="34" charset="0"/>
                                         <a:cs typeface="Arial" panose="020B0604020202020204" pitchFamily="34" charset="0"/>
                                       </a:rPr>
@@ -6194,6 +6444,7 @@
                                   <m:num>
                                     <m:r>
                                       <a:rPr lang="en-GB" sz="1400" i="1">
+                                        <a:latin typeface="Cambria Math" panose="02040503050406030204" pitchFamily="18" charset="0"/>
                                         <a:ea typeface="Calibri" panose="020F0502020204030204" pitchFamily="34" charset="0"/>
                                         <a:cs typeface="Arial" panose="020B0604020202020204" pitchFamily="34" charset="0"/>
                                       </a:rPr>
@@ -6203,6 +6454,7 @@
                                       <m:funcPr>
                                         <m:ctrlPr>
                                           <a:rPr lang="fr-CH" sz="1400" i="1">
+                                            <a:latin typeface="Cambria Math" panose="02040503050406030204" pitchFamily="18" charset="0"/>
                                             <a:ea typeface="Calibri" panose="020F0502020204030204" pitchFamily="34" charset="0"/>
                                             <a:cs typeface="Arial" panose="020B0604020202020204" pitchFamily="34" charset="0"/>
                                           </a:rPr>
@@ -6214,6 +6466,7 @@
                                             <m:sty m:val="p"/>
                                           </m:rPr>
                                           <a:rPr lang="en-GB" sz="1400">
+                                            <a:latin typeface="Cambria Math" panose="02040503050406030204" pitchFamily="18" charset="0"/>
                                             <a:ea typeface="Calibri" panose="020F0502020204030204" pitchFamily="34" charset="0"/>
                                             <a:cs typeface="Arial" panose="020B0604020202020204" pitchFamily="34" charset="0"/>
                                           </a:rPr>
@@ -6225,6 +6478,7 @@
                                           <m:dPr>
                                             <m:ctrlPr>
                                               <a:rPr lang="fr-CH" sz="1400" i="1">
+                                                <a:latin typeface="Cambria Math" panose="02040503050406030204" pitchFamily="18" charset="0"/>
                                                 <a:ea typeface="Calibri" panose="020F0502020204030204" pitchFamily="34" charset="0"/>
                                                 <a:cs typeface="Arial" panose="020B0604020202020204" pitchFamily="34" charset="0"/>
                                               </a:rPr>
@@ -6233,6 +6487,7 @@
                                           <m:e>
                                             <m:r>
                                               <a:rPr lang="en-GB" sz="1400" i="1">
+                                                <a:latin typeface="Cambria Math" panose="02040503050406030204" pitchFamily="18" charset="0"/>
                                                 <a:ea typeface="Calibri" panose="020F0502020204030204" pitchFamily="34" charset="0"/>
                                                 <a:cs typeface="Arial" panose="020B0604020202020204" pitchFamily="34" charset="0"/>
                                               </a:rPr>
@@ -6240,6 +6495,7 @@
                                             </m:r>
                                             <m:r>
                                               <a:rPr lang="en-GB" sz="1400" i="1">
+                                                <a:latin typeface="Cambria Math" panose="02040503050406030204" pitchFamily="18" charset="0"/>
                                                 <a:ea typeface="Calibri" panose="020F0502020204030204" pitchFamily="34" charset="0"/>
                                                 <a:cs typeface="Arial" panose="020B0604020202020204" pitchFamily="34" charset="0"/>
                                               </a:rPr>
@@ -6247,6 +6503,7 @@
                                             </m:r>
                                             <m:r>
                                               <a:rPr lang="en-GB" sz="1400" i="1">
+                                                <a:latin typeface="Cambria Math" panose="02040503050406030204" pitchFamily="18" charset="0"/>
                                                 <a:ea typeface="Calibri" panose="020F0502020204030204" pitchFamily="34" charset="0"/>
                                                 <a:cs typeface="Arial" panose="020B0604020202020204" pitchFamily="34" charset="0"/>
                                               </a:rPr>
@@ -6258,6 +6515,7 @@
                                     </m:func>
                                     <m:r>
                                       <a:rPr lang="en-GB" sz="1400" i="1">
+                                        <a:latin typeface="Cambria Math" panose="02040503050406030204" pitchFamily="18" charset="0"/>
                                         <a:ea typeface="Calibri" panose="020F0502020204030204" pitchFamily="34" charset="0"/>
                                         <a:cs typeface="Arial" panose="020B0604020202020204" pitchFamily="34" charset="0"/>
                                       </a:rPr>
@@ -6268,6 +6526,7 @@
                                         <m:sty m:val="p"/>
                                       </m:rPr>
                                       <a:rPr lang="en-GB" sz="1400">
+                                        <a:latin typeface="Cambria Math" panose="02040503050406030204" pitchFamily="18" charset="0"/>
                                         <a:ea typeface="Calibri" panose="020F0502020204030204" pitchFamily="34" charset="0"/>
                                         <a:cs typeface="Arial" panose="020B0604020202020204" pitchFamily="34" charset="0"/>
                                       </a:rPr>
@@ -6275,6 +6534,7 @@
                                     </m:r>
                                     <m:r>
                                       <a:rPr lang="en-GB" sz="1400" i="1">
+                                        <a:latin typeface="Cambria Math" panose="02040503050406030204" pitchFamily="18" charset="0"/>
                                         <a:ea typeface="Calibri" panose="020F0502020204030204" pitchFamily="34" charset="0"/>
                                         <a:cs typeface="Arial" panose="020B0604020202020204" pitchFamily="34" charset="0"/>
                                       </a:rPr>
@@ -6282,6 +6542,7 @@
                                     </m:r>
                                     <m:r>
                                       <a:rPr lang="en-GB" sz="1400" i="1">
+                                        <a:latin typeface="Cambria Math" panose="02040503050406030204" pitchFamily="18" charset="0"/>
                                         <a:ea typeface="Calibri" panose="020F0502020204030204" pitchFamily="34" charset="0"/>
                                         <a:cs typeface="Arial" panose="020B0604020202020204" pitchFamily="34" charset="0"/>
                                       </a:rPr>
@@ -6289,6 +6550,7 @@
                                     </m:r>
                                     <m:r>
                                       <a:rPr lang="en-GB" sz="1400" i="1">
+                                        <a:latin typeface="Cambria Math" panose="02040503050406030204" pitchFamily="18" charset="0"/>
                                         <a:ea typeface="Calibri" panose="020F0502020204030204" pitchFamily="34" charset="0"/>
                                         <a:cs typeface="Arial" panose="020B0604020202020204" pitchFamily="34" charset="0"/>
                                       </a:rPr>
@@ -6296,6 +6558,7 @@
                                     </m:r>
                                     <m:r>
                                       <a:rPr lang="en-GB" sz="1400" i="1">
+                                        <a:latin typeface="Cambria Math" panose="02040503050406030204" pitchFamily="18" charset="0"/>
                                         <a:ea typeface="Calibri" panose="020F0502020204030204" pitchFamily="34" charset="0"/>
                                         <a:cs typeface="Arial" panose="020B0604020202020204" pitchFamily="34" charset="0"/>
                                       </a:rPr>
@@ -6303,6 +6566,7 @@
                                     </m:r>
                                     <m:r>
                                       <a:rPr lang="en-GB" sz="1400" i="1">
+                                        <a:latin typeface="Cambria Math" panose="02040503050406030204" pitchFamily="18" charset="0"/>
                                         <a:ea typeface="Calibri" panose="020F0502020204030204" pitchFamily="34" charset="0"/>
                                         <a:cs typeface="Arial" panose="020B0604020202020204" pitchFamily="34" charset="0"/>
                                       </a:rPr>
@@ -6312,6 +6576,7 @@
                                   <m:den>
                                     <m:r>
                                       <a:rPr lang="en-GB" sz="1400" i="1">
+                                        <a:latin typeface="Cambria Math" panose="02040503050406030204" pitchFamily="18" charset="0"/>
                                         <a:ea typeface="Calibri" panose="020F0502020204030204" pitchFamily="34" charset="0"/>
                                         <a:cs typeface="Arial" panose="020B0604020202020204" pitchFamily="34" charset="0"/>
                                       </a:rPr>
@@ -6325,6 +6590,7 @@
                               <m:e>
                                 <m:r>
                                   <a:rPr lang="en-GB" sz="1400" i="1">
+                                    <a:latin typeface="Cambria Math" panose="02040503050406030204" pitchFamily="18" charset="0"/>
                                     <a:ea typeface="Calibri" panose="020F0502020204030204" pitchFamily="34" charset="0"/>
                                     <a:cs typeface="Arial" panose="020B0604020202020204" pitchFamily="34" charset="0"/>
                                   </a:rPr>
@@ -6332,6 +6598,7 @@
                                 </m:r>
                                 <m:r>
                                   <a:rPr lang="en-GB" sz="1400" i="1">
+                                    <a:latin typeface="Cambria Math" panose="02040503050406030204" pitchFamily="18" charset="0"/>
                                     <a:ea typeface="Calibri" panose="020F0502020204030204" pitchFamily="34" charset="0"/>
                                     <a:cs typeface="Arial" panose="020B0604020202020204" pitchFamily="34" charset="0"/>
                                   </a:rPr>
@@ -6344,6 +6611,7 @@
                       </m:d>
                       <m:r>
                         <a:rPr lang="en-GB" sz="1400" i="1">
+                          <a:latin typeface="Cambria Math" panose="02040503050406030204" pitchFamily="18" charset="0"/>
                           <a:ea typeface="Calibri" panose="020F0502020204030204" pitchFamily="34" charset="0"/>
                           <a:cs typeface="Arial" panose="020B0604020202020204" pitchFamily="34" charset="0"/>
                         </a:rPr>
@@ -6354,6 +6622,7 @@
                           <m:chr m:val="⃑"/>
                           <m:ctrlPr>
                             <a:rPr lang="fr-CH" sz="1400" i="1">
+                              <a:latin typeface="Cambria Math" panose="02040503050406030204" pitchFamily="18" charset="0"/>
                               <a:ea typeface="Calibri" panose="020F0502020204030204" pitchFamily="34" charset="0"/>
                               <a:cs typeface="Arial" panose="020B0604020202020204" pitchFamily="34" charset="0"/>
                             </a:rPr>
@@ -6362,6 +6631,7 @@
                         <m:e>
                           <m:r>
                             <a:rPr lang="en-GB" sz="1400" i="1">
+                              <a:latin typeface="Cambria Math" panose="02040503050406030204" pitchFamily="18" charset="0"/>
                               <a:ea typeface="Calibri" panose="020F0502020204030204" pitchFamily="34" charset="0"/>
                               <a:cs typeface="Arial" panose="020B0604020202020204" pitchFamily="34" charset="0"/>
                             </a:rPr>
@@ -6396,6 +6666,7 @@
                         <m:sSupPr>
                           <m:ctrlPr>
                             <a:rPr lang="fr-CH" sz="1400" i="1">
+                              <a:latin typeface="Cambria Math" panose="02040503050406030204" pitchFamily="18" charset="0"/>
                               <a:ea typeface="Times New Roman" panose="02020603050405020304" pitchFamily="18" charset="0"/>
                               <a:cs typeface="Arial" panose="020B0604020202020204" pitchFamily="34" charset="0"/>
                             </a:rPr>
@@ -6404,6 +6675,7 @@
                         <m:e>
                           <m:r>
                             <a:rPr lang="en-GB" sz="1400" i="1">
+                              <a:latin typeface="Cambria Math" panose="02040503050406030204" pitchFamily="18" charset="0"/>
                               <a:ea typeface="Times New Roman" panose="02020603050405020304" pitchFamily="18" charset="0"/>
                               <a:cs typeface="Arial" panose="020B0604020202020204" pitchFamily="34" charset="0"/>
                             </a:rPr>
@@ -6413,6 +6685,7 @@
                         <m:sup>
                           <m:r>
                             <a:rPr lang="en-GB" sz="1400" i="1">
+                              <a:latin typeface="Cambria Math" panose="02040503050406030204" pitchFamily="18" charset="0"/>
                               <a:ea typeface="Times New Roman" panose="02020603050405020304" pitchFamily="18" charset="0"/>
                               <a:cs typeface="Arial" panose="020B0604020202020204" pitchFamily="34" charset="0"/>
                             </a:rPr>
@@ -6422,6 +6695,7 @@
                       </m:sSup>
                       <m:r>
                         <a:rPr lang="en-GB" sz="1400" i="1">
+                          <a:latin typeface="Cambria Math" panose="02040503050406030204" pitchFamily="18" charset="0"/>
                           <a:ea typeface="Times New Roman" panose="02020603050405020304" pitchFamily="18" charset="0"/>
                           <a:cs typeface="Arial" panose="020B0604020202020204" pitchFamily="34" charset="0"/>
                         </a:rPr>
@@ -6431,6 +6705,7 @@
                         <m:dPr>
                           <m:ctrlPr>
                             <a:rPr lang="fr-CH" sz="1400" i="1">
+                              <a:latin typeface="Cambria Math" panose="02040503050406030204" pitchFamily="18" charset="0"/>
                               <a:ea typeface="Calibri" panose="020F0502020204030204" pitchFamily="34" charset="0"/>
                               <a:cs typeface="Arial" panose="020B0604020202020204" pitchFamily="34" charset="0"/>
                             </a:rPr>
@@ -6449,6 +6724,7 @@
                               </m:mcs>
                               <m:ctrlPr>
                                 <a:rPr lang="fr-CH" sz="1400" i="1">
+                                  <a:latin typeface="Cambria Math" panose="02040503050406030204" pitchFamily="18" charset="0"/>
                                   <a:ea typeface="Calibri" panose="020F0502020204030204" pitchFamily="34" charset="0"/>
                                   <a:cs typeface="Arial" panose="020B0604020202020204" pitchFamily="34" charset="0"/>
                                 </a:rPr>
@@ -6460,6 +6736,7 @@
                                   <m:fPr>
                                     <m:ctrlPr>
                                       <a:rPr lang="fr-CH" sz="1400" i="1">
+                                        <a:latin typeface="Cambria Math" panose="02040503050406030204" pitchFamily="18" charset="0"/>
                                         <a:ea typeface="Calibri" panose="020F0502020204030204" pitchFamily="34" charset="0"/>
                                         <a:cs typeface="Arial" panose="020B0604020202020204" pitchFamily="34" charset="0"/>
                                       </a:rPr>
@@ -6470,6 +6747,7 @@
                                       <m:funcPr>
                                         <m:ctrlPr>
                                           <a:rPr lang="fr-CH" sz="1400" i="1">
+                                            <a:latin typeface="Cambria Math" panose="02040503050406030204" pitchFamily="18" charset="0"/>
                                             <a:ea typeface="Calibri" panose="020F0502020204030204" pitchFamily="34" charset="0"/>
                                             <a:cs typeface="Arial" panose="020B0604020202020204" pitchFamily="34" charset="0"/>
                                           </a:rPr>
@@ -6481,6 +6759,7 @@
                                             <m:sty m:val="p"/>
                                           </m:rPr>
                                           <a:rPr lang="en-GB" sz="1400">
+                                            <a:latin typeface="Cambria Math" panose="02040503050406030204" pitchFamily="18" charset="0"/>
                                             <a:ea typeface="Calibri" panose="020F0502020204030204" pitchFamily="34" charset="0"/>
                                             <a:cs typeface="Arial" panose="020B0604020202020204" pitchFamily="34" charset="0"/>
                                           </a:rPr>
@@ -6492,6 +6771,7 @@
                                           <m:dPr>
                                             <m:ctrlPr>
                                               <a:rPr lang="fr-CH" sz="1400" i="1">
+                                                <a:latin typeface="Cambria Math" panose="02040503050406030204" pitchFamily="18" charset="0"/>
                                                 <a:ea typeface="Calibri" panose="020F0502020204030204" pitchFamily="34" charset="0"/>
                                                 <a:cs typeface="Arial" panose="020B0604020202020204" pitchFamily="34" charset="0"/>
                                               </a:rPr>
@@ -6500,6 +6780,7 @@
                                           <m:e>
                                             <m:r>
                                               <a:rPr lang="en-GB" sz="1400" i="1">
+                                                <a:latin typeface="Cambria Math" panose="02040503050406030204" pitchFamily="18" charset="0"/>
                                                 <a:ea typeface="Calibri" panose="020F0502020204030204" pitchFamily="34" charset="0"/>
                                                 <a:cs typeface="Arial" panose="020B0604020202020204" pitchFamily="34" charset="0"/>
                                               </a:rPr>
@@ -6507,6 +6788,7 @@
                                             </m:r>
                                             <m:r>
                                               <a:rPr lang="en-GB" sz="1400" i="1">
+                                                <a:latin typeface="Cambria Math" panose="02040503050406030204" pitchFamily="18" charset="0"/>
                                                 <a:ea typeface="Calibri" panose="020F0502020204030204" pitchFamily="34" charset="0"/>
                                                 <a:cs typeface="Arial" panose="020B0604020202020204" pitchFamily="34" charset="0"/>
                                               </a:rPr>
@@ -6514,6 +6796,7 @@
                                             </m:r>
                                             <m:r>
                                               <a:rPr lang="en-GB" sz="1400" i="1">
+                                                <a:latin typeface="Cambria Math" panose="02040503050406030204" pitchFamily="18" charset="0"/>
                                                 <a:ea typeface="Calibri" panose="020F0502020204030204" pitchFamily="34" charset="0"/>
                                                 <a:cs typeface="Arial" panose="020B0604020202020204" pitchFamily="34" charset="0"/>
                                               </a:rPr>
@@ -6525,6 +6808,7 @@
                                     </m:func>
                                     <m:r>
                                       <a:rPr lang="en-GB" sz="1400" i="1">
+                                        <a:latin typeface="Cambria Math" panose="02040503050406030204" pitchFamily="18" charset="0"/>
                                         <a:ea typeface="Calibri" panose="020F0502020204030204" pitchFamily="34" charset="0"/>
                                         <a:cs typeface="Arial" panose="020B0604020202020204" pitchFamily="34" charset="0"/>
                                       </a:rPr>
@@ -6535,6 +6819,7 @@
                                         <m:sty m:val="p"/>
                                       </m:rPr>
                                       <a:rPr lang="en-GB" sz="1400">
+                                        <a:latin typeface="Cambria Math" panose="02040503050406030204" pitchFamily="18" charset="0"/>
                                         <a:ea typeface="Calibri" panose="020F0502020204030204" pitchFamily="34" charset="0"/>
                                         <a:cs typeface="Arial" panose="020B0604020202020204" pitchFamily="34" charset="0"/>
                                       </a:rPr>
@@ -6542,6 +6827,7 @@
                                     </m:r>
                                     <m:r>
                                       <a:rPr lang="en-GB" sz="1400" i="1">
+                                        <a:latin typeface="Cambria Math" panose="02040503050406030204" pitchFamily="18" charset="0"/>
                                         <a:ea typeface="Calibri" panose="020F0502020204030204" pitchFamily="34" charset="0"/>
                                         <a:cs typeface="Arial" panose="020B0604020202020204" pitchFamily="34" charset="0"/>
                                       </a:rPr>
@@ -6549,6 +6835,7 @@
                                     </m:r>
                                     <m:r>
                                       <a:rPr lang="en-GB" sz="1400" i="1">
+                                        <a:latin typeface="Cambria Math" panose="02040503050406030204" pitchFamily="18" charset="0"/>
                                         <a:ea typeface="Calibri" panose="020F0502020204030204" pitchFamily="34" charset="0"/>
                                         <a:cs typeface="Arial" panose="020B0604020202020204" pitchFamily="34" charset="0"/>
                                       </a:rPr>
@@ -6556,6 +6843,7 @@
                                     </m:r>
                                     <m:r>
                                       <a:rPr lang="en-GB" sz="1400" i="1">
+                                        <a:latin typeface="Cambria Math" panose="02040503050406030204" pitchFamily="18" charset="0"/>
                                         <a:ea typeface="Calibri" panose="020F0502020204030204" pitchFamily="34" charset="0"/>
                                         <a:cs typeface="Arial" panose="020B0604020202020204" pitchFamily="34" charset="0"/>
                                       </a:rPr>
@@ -6563,6 +6851,7 @@
                                     </m:r>
                                     <m:r>
                                       <a:rPr lang="en-GB" sz="1400" i="1">
+                                        <a:latin typeface="Cambria Math" panose="02040503050406030204" pitchFamily="18" charset="0"/>
                                         <a:ea typeface="Calibri" panose="020F0502020204030204" pitchFamily="34" charset="0"/>
                                         <a:cs typeface="Arial" panose="020B0604020202020204" pitchFamily="34" charset="0"/>
                                       </a:rPr>
@@ -6570,6 +6859,7 @@
                                     </m:r>
                                     <m:r>
                                       <a:rPr lang="en-GB" sz="1400" i="1">
+                                        <a:latin typeface="Cambria Math" panose="02040503050406030204" pitchFamily="18" charset="0"/>
                                         <a:ea typeface="Calibri" panose="020F0502020204030204" pitchFamily="34" charset="0"/>
                                         <a:cs typeface="Arial" panose="020B0604020202020204" pitchFamily="34" charset="0"/>
                                       </a:rPr>
@@ -6579,6 +6869,7 @@
                                   <m:den>
                                     <m:r>
                                       <a:rPr lang="en-GB" sz="1400" i="1">
+                                        <a:latin typeface="Cambria Math" panose="02040503050406030204" pitchFamily="18" charset="0"/>
                                         <a:ea typeface="Calibri" panose="020F0502020204030204" pitchFamily="34" charset="0"/>
                                         <a:cs typeface="Arial" panose="020B0604020202020204" pitchFamily="34" charset="0"/>
                                       </a:rPr>
@@ -6594,6 +6885,7 @@
                                   <m:fPr>
                                     <m:ctrlPr>
                                       <a:rPr lang="fr-CH" sz="1400" i="1">
+                                        <a:latin typeface="Cambria Math" panose="02040503050406030204" pitchFamily="18" charset="0"/>
                                         <a:ea typeface="Calibri" panose="020F0502020204030204" pitchFamily="34" charset="0"/>
                                         <a:cs typeface="Arial" panose="020B0604020202020204" pitchFamily="34" charset="0"/>
                                       </a:rPr>
@@ -6604,6 +6896,7 @@
                                       <m:funcPr>
                                         <m:ctrlPr>
                                           <a:rPr lang="fr-CH" sz="1400" i="1">
+                                            <a:latin typeface="Cambria Math" panose="02040503050406030204" pitchFamily="18" charset="0"/>
                                             <a:ea typeface="Calibri" panose="020F0502020204030204" pitchFamily="34" charset="0"/>
                                             <a:cs typeface="Arial" panose="020B0604020202020204" pitchFamily="34" charset="0"/>
                                           </a:rPr>
@@ -6615,6 +6908,7 @@
                                             <m:sty m:val="p"/>
                                           </m:rPr>
                                           <a:rPr lang="en-GB" sz="1400">
+                                            <a:latin typeface="Cambria Math" panose="02040503050406030204" pitchFamily="18" charset="0"/>
                                             <a:ea typeface="Calibri" panose="020F0502020204030204" pitchFamily="34" charset="0"/>
                                             <a:cs typeface="Arial" panose="020B0604020202020204" pitchFamily="34" charset="0"/>
                                           </a:rPr>
@@ -6626,6 +6920,7 @@
                                           <m:dPr>
                                             <m:ctrlPr>
                                               <a:rPr lang="fr-CH" sz="1400" i="1">
+                                                <a:latin typeface="Cambria Math" panose="02040503050406030204" pitchFamily="18" charset="0"/>
                                                 <a:ea typeface="Calibri" panose="020F0502020204030204" pitchFamily="34" charset="0"/>
                                                 <a:cs typeface="Arial" panose="020B0604020202020204" pitchFamily="34" charset="0"/>
                                               </a:rPr>
@@ -6634,6 +6929,7 @@
                                           <m:e>
                                             <m:r>
                                               <a:rPr lang="en-GB" sz="1400" i="1">
+                                                <a:latin typeface="Cambria Math" panose="02040503050406030204" pitchFamily="18" charset="0"/>
                                                 <a:ea typeface="Calibri" panose="020F0502020204030204" pitchFamily="34" charset="0"/>
                                                 <a:cs typeface="Arial" panose="020B0604020202020204" pitchFamily="34" charset="0"/>
                                               </a:rPr>
@@ -6641,6 +6937,7 @@
                                             </m:r>
                                             <m:r>
                                               <a:rPr lang="en-GB" sz="1400" i="1">
+                                                <a:latin typeface="Cambria Math" panose="02040503050406030204" pitchFamily="18" charset="0"/>
                                                 <a:ea typeface="Calibri" panose="020F0502020204030204" pitchFamily="34" charset="0"/>
                                                 <a:cs typeface="Arial" panose="020B0604020202020204" pitchFamily="34" charset="0"/>
                                               </a:rPr>
@@ -6648,6 +6945,7 @@
                                             </m:r>
                                             <m:r>
                                               <a:rPr lang="en-GB" sz="1400" i="1">
+                                                <a:latin typeface="Cambria Math" panose="02040503050406030204" pitchFamily="18" charset="0"/>
                                                 <a:ea typeface="Calibri" panose="020F0502020204030204" pitchFamily="34" charset="0"/>
                                                 <a:cs typeface="Arial" panose="020B0604020202020204" pitchFamily="34" charset="0"/>
                                               </a:rPr>
@@ -6659,6 +6957,7 @@
                                     </m:func>
                                     <m:r>
                                       <a:rPr lang="en-GB" sz="1400" i="1">
+                                        <a:latin typeface="Cambria Math" panose="02040503050406030204" pitchFamily="18" charset="0"/>
                                         <a:ea typeface="Calibri" panose="020F0502020204030204" pitchFamily="34" charset="0"/>
                                         <a:cs typeface="Arial" panose="020B0604020202020204" pitchFamily="34" charset="0"/>
                                       </a:rPr>
@@ -6669,6 +6968,7 @@
                                         <m:sty m:val="p"/>
                                       </m:rPr>
                                       <a:rPr lang="en-GB" sz="1400">
+                                        <a:latin typeface="Cambria Math" panose="02040503050406030204" pitchFamily="18" charset="0"/>
                                         <a:ea typeface="Calibri" panose="020F0502020204030204" pitchFamily="34" charset="0"/>
                                         <a:cs typeface="Arial" panose="020B0604020202020204" pitchFamily="34" charset="0"/>
                                       </a:rPr>
@@ -6676,6 +6976,7 @@
                                     </m:r>
                                     <m:r>
                                       <a:rPr lang="en-GB" sz="1400" i="1">
+                                        <a:latin typeface="Cambria Math" panose="02040503050406030204" pitchFamily="18" charset="0"/>
                                         <a:ea typeface="Calibri" panose="020F0502020204030204" pitchFamily="34" charset="0"/>
                                         <a:cs typeface="Arial" panose="020B0604020202020204" pitchFamily="34" charset="0"/>
                                       </a:rPr>
@@ -6683,6 +6984,7 @@
                                     </m:r>
                                     <m:r>
                                       <a:rPr lang="en-GB" sz="1400" i="1">
+                                        <a:latin typeface="Cambria Math" panose="02040503050406030204" pitchFamily="18" charset="0"/>
                                         <a:ea typeface="Calibri" panose="020F0502020204030204" pitchFamily="34" charset="0"/>
                                         <a:cs typeface="Arial" panose="020B0604020202020204" pitchFamily="34" charset="0"/>
                                       </a:rPr>
@@ -6690,6 +6992,7 @@
                                     </m:r>
                                     <m:r>
                                       <a:rPr lang="en-GB" sz="1400" i="1">
+                                        <a:latin typeface="Cambria Math" panose="02040503050406030204" pitchFamily="18" charset="0"/>
                                         <a:ea typeface="Calibri" panose="020F0502020204030204" pitchFamily="34" charset="0"/>
                                         <a:cs typeface="Arial" panose="020B0604020202020204" pitchFamily="34" charset="0"/>
                                       </a:rPr>
@@ -6697,6 +7000,7 @@
                                     </m:r>
                                     <m:r>
                                       <a:rPr lang="en-GB" sz="1400" i="1">
+                                        <a:latin typeface="Cambria Math" panose="02040503050406030204" pitchFamily="18" charset="0"/>
                                         <a:ea typeface="Calibri" panose="020F0502020204030204" pitchFamily="34" charset="0"/>
                                         <a:cs typeface="Arial" panose="020B0604020202020204" pitchFamily="34" charset="0"/>
                                       </a:rPr>
@@ -6704,6 +7008,7 @@
                                     </m:r>
                                     <m:r>
                                       <a:rPr lang="en-GB" sz="1400" i="1">
+                                        <a:latin typeface="Cambria Math" panose="02040503050406030204" pitchFamily="18" charset="0"/>
                                         <a:ea typeface="Calibri" panose="020F0502020204030204" pitchFamily="34" charset="0"/>
                                         <a:cs typeface="Arial" panose="020B0604020202020204" pitchFamily="34" charset="0"/>
                                       </a:rPr>
@@ -6713,6 +7018,7 @@
                                   <m:den>
                                     <m:r>
                                       <a:rPr lang="en-GB" sz="1400" i="1">
+                                        <a:latin typeface="Cambria Math" panose="02040503050406030204" pitchFamily="18" charset="0"/>
                                         <a:ea typeface="Calibri" panose="020F0502020204030204" pitchFamily="34" charset="0"/>
                                         <a:cs typeface="Arial" panose="020B0604020202020204" pitchFamily="34" charset="0"/>
                                       </a:rPr>
@@ -6726,6 +7032,7 @@
                               <m:e>
                                 <m:r>
                                   <a:rPr lang="en-GB" sz="1400" i="1">
+                                    <a:latin typeface="Cambria Math" panose="02040503050406030204" pitchFamily="18" charset="0"/>
                                     <a:ea typeface="Calibri" panose="020F0502020204030204" pitchFamily="34" charset="0"/>
                                     <a:cs typeface="Arial" panose="020B0604020202020204" pitchFamily="34" charset="0"/>
                                   </a:rPr>
@@ -6733,6 +7040,7 @@
                                 </m:r>
                                 <m:r>
                                   <a:rPr lang="en-GB" sz="1400" i="1">
+                                    <a:latin typeface="Cambria Math" panose="02040503050406030204" pitchFamily="18" charset="0"/>
                                     <a:ea typeface="Calibri" panose="020F0502020204030204" pitchFamily="34" charset="0"/>
                                     <a:cs typeface="Arial" panose="020B0604020202020204" pitchFamily="34" charset="0"/>
                                   </a:rPr>
@@ -6740,6 +7048,7 @@
                                 </m:r>
                                 <m:r>
                                   <a:rPr lang="en-GB" sz="1400" i="1">
+                                    <a:latin typeface="Cambria Math" panose="02040503050406030204" pitchFamily="18" charset="0"/>
                                     <a:ea typeface="Calibri" panose="020F0502020204030204" pitchFamily="34" charset="0"/>
                                     <a:cs typeface="Arial" panose="020B0604020202020204" pitchFamily="34" charset="0"/>
                                   </a:rPr>
@@ -6752,6 +7061,7 @@
                       </m:d>
                       <m:r>
                         <a:rPr lang="en-GB" sz="1400" i="1">
+                          <a:latin typeface="Cambria Math" panose="02040503050406030204" pitchFamily="18" charset="0"/>
                           <a:ea typeface="Calibri" panose="020F0502020204030204" pitchFamily="34" charset="0"/>
                           <a:cs typeface="Arial" panose="020B0604020202020204" pitchFamily="34" charset="0"/>
                         </a:rPr>
@@ -6762,6 +7072,7 @@
                           <m:chr m:val="⃑"/>
                           <m:ctrlPr>
                             <a:rPr lang="fr-CH" sz="1400" i="1">
+                              <a:latin typeface="Cambria Math" panose="02040503050406030204" pitchFamily="18" charset="0"/>
                               <a:ea typeface="Calibri" panose="020F0502020204030204" pitchFamily="34" charset="0"/>
                               <a:cs typeface="Arial" panose="020B0604020202020204" pitchFamily="34" charset="0"/>
                             </a:rPr>
@@ -6770,6 +7081,7 @@
                         <m:e>
                           <m:r>
                             <a:rPr lang="en-GB" sz="1400" i="1">
+                              <a:latin typeface="Cambria Math" panose="02040503050406030204" pitchFamily="18" charset="0"/>
                               <a:ea typeface="Calibri" panose="020F0502020204030204" pitchFamily="34" charset="0"/>
                               <a:cs typeface="Arial" panose="020B0604020202020204" pitchFamily="34" charset="0"/>
                             </a:rPr>
@@ -6788,7 +7100,7 @@
             </p:txBody>
           </p:sp>
         </mc:Choice>
-        <mc:Fallback>
+        <mc:Fallback xmlns="">
           <p:sp>
             <p:nvSpPr>
               <p:cNvPr id="6" name="Rectangle 5">
@@ -6933,8 +7245,8 @@
           </a:prstGeom>
         </p:spPr>
       </p:pic>
-      <mc:AlternateContent xmlns:mc="http://schemas.openxmlformats.org/markup-compatibility/2006">
-        <mc:Choice xmlns:a14="http://schemas.microsoft.com/office/drawing/2010/main" Requires="a14">
+      <mc:AlternateContent xmlns:mc="http://schemas.openxmlformats.org/markup-compatibility/2006" xmlns:a14="http://schemas.microsoft.com/office/drawing/2010/main">
+        <mc:Choice Requires="a14">
           <p:sp>
             <p:nvSpPr>
               <p:cNvPr id="8" name="Rectangle 7">
@@ -7700,7 +8012,7 @@
             </p:txBody>
           </p:sp>
         </mc:Choice>
-        <mc:Fallback>
+        <mc:Fallback xmlns="">
           <p:sp>
             <p:nvSpPr>
               <p:cNvPr id="8" name="Rectangle 7">

</xml_diff>